<commit_message>
Fixed space in [DESCRIPTION]: field for the Flat File
</commit_message>
<xml_diff>
--- a/docs/cna/CVE_Entry_Submission_Process.pptx
+++ b/docs/cna/CVE_Entry_Submission_Process.pptx
@@ -269,7 +269,7 @@
           <a:p>
             <a:fld id="{FD8C879B-2DAC-426D-B5B4-08F42B952A26}" type="datetimeFigureOut">
               <a:rPr lang="en-US" smtClean="0"/>
-              <a:t>5/21/2019</a:t>
+              <a:t>9/9/2019</a:t>
             </a:fld>
             <a:endParaRPr lang="en-US"/>
           </a:p>
@@ -446,7 +446,7 @@
           <a:p>
             <a:fld id="{92E54576-A3BB-48F9-891E-992E86D01A7B}" type="datetimeFigureOut">
               <a:rPr lang="en-US" smtClean="0"/>
-              <a:t>5/21/2019</a:t>
+              <a:t>9/9/2019</a:t>
             </a:fld>
             <a:endParaRPr lang="en-US"/>
           </a:p>
@@ -2355,7 +2355,7 @@
   <p:clrMapOvr>
     <a:masterClrMapping/>
   </p:clrMapOvr>
-  <p:extLst mod="1">
+  <p:extLst>
     <p:ext uri="{DCECCB84-F9BA-43D5-87BE-67443E8EF086}">
       <p15:sldGuideLst xmlns:p15="http://schemas.microsoft.com/office/powerpoint/2012/main">
         <p15:guide id="1" orient="horz" pos="2160">
@@ -5337,7 +5337,7 @@
       </a:lvl9pPr>
     </p:otherStyle>
   </p:txStyles>
-  <p:extLst mod="1">
+  <p:extLst>
     <p:ext uri="{27BBF7A9-308A-43DC-89C8-2F10F3537804}">
       <p15:sldGuideLst xmlns:p15="http://schemas.microsoft.com/office/powerpoint/2012/main"/>
     </p:ext>
@@ -14238,9 +14238,10 @@
               <a:buNone/>
             </a:pPr>
             <a:r>
-              <a:rPr lang="en-US" dirty="0"/>
-              <a:t>[DESCRIPTION ]:</a:t>
-            </a:r>
+              <a:rPr lang="en-US"/>
+              <a:t>[DESCRIPTION]:</a:t>
+            </a:r>
+            <a:endParaRPr lang="en-US" dirty="0"/>
           </a:p>
           <a:p>
             <a:pPr marL="0" indent="0">
@@ -15465,18 +15466,18 @@
 </file>
 
 <file path=customXml/item1.xml><?xml version="1.0" encoding="utf-8"?>
+<p:properties xmlns:p="http://schemas.microsoft.com/office/2006/metadata/properties" xmlns:xsi="http://www.w3.org/2001/XMLSchema-instance" xmlns:pc="http://schemas.microsoft.com/office/infopath/2007/PartnerControls">
+  <documentManagement/>
+</p:properties>
+</file>
+
+<file path=customXml/item2.xml><?xml version="1.0" encoding="utf-8"?>
 <?mso-contentType ?>
 <FormTemplates xmlns="http://schemas.microsoft.com/sharepoint/v3/contenttype/forms">
   <Display>DocumentLibraryForm</Display>
   <Edit>DocumentLibraryForm</Edit>
   <New>DocumentLibraryForm</New>
 </FormTemplates>
-</file>
-
-<file path=customXml/item2.xml><?xml version="1.0" encoding="utf-8"?>
-<p:properties xmlns:p="http://schemas.microsoft.com/office/2006/metadata/properties" xmlns:xsi="http://www.w3.org/2001/XMLSchema-instance" xmlns:pc="http://schemas.microsoft.com/office/infopath/2007/PartnerControls">
-  <documentManagement/>
-</p:properties>
 </file>
 
 <file path=customXml/item3.xml><?xml version="1.0" encoding="utf-8"?>
@@ -15594,14 +15595,6 @@
 </file>
 
 <file path=customXml/itemProps1.xml><?xml version="1.0" encoding="utf-8"?>
-<ds:datastoreItem xmlns:ds="http://schemas.openxmlformats.org/officeDocument/2006/customXml" ds:itemID="{416BA5C9-2D71-4B86-AE8A-8C0D9BC5FB22}">
-  <ds:schemaRefs>
-    <ds:schemaRef ds:uri="http://schemas.microsoft.com/sharepoint/v3/contenttype/forms"/>
-  </ds:schemaRefs>
-</ds:datastoreItem>
-</file>
-
-<file path=customXml/itemProps2.xml><?xml version="1.0" encoding="utf-8"?>
 <ds:datastoreItem xmlns:ds="http://schemas.openxmlformats.org/officeDocument/2006/customXml" ds:itemID="{5450FCDD-08B1-48D8-BB50-7A17E590A5EE}">
   <ds:schemaRefs>
     <ds:schemaRef ds:uri="http://purl.org/dc/terms/"/>
@@ -15612,6 +15605,14 @@
     <ds:schemaRef ds:uri="http://schemas.microsoft.com/office/2006/documentManagement/types"/>
     <ds:schemaRef ds:uri="http://schemas.openxmlformats.org/package/2006/metadata/core-properties"/>
     <ds:schemaRef ds:uri="http://schemas.microsoft.com/office/2006/metadata/properties"/>
+  </ds:schemaRefs>
+</ds:datastoreItem>
+</file>
+
+<file path=customXml/itemProps2.xml><?xml version="1.0" encoding="utf-8"?>
+<ds:datastoreItem xmlns:ds="http://schemas.openxmlformats.org/officeDocument/2006/customXml" ds:itemID="{416BA5C9-2D71-4B86-AE8A-8C0D9BC5FB22}">
+  <ds:schemaRefs>
+    <ds:schemaRef ds:uri="http://schemas.microsoft.com/sharepoint/v3/contenttype/forms"/>
   </ds:schemaRefs>
 </ds:datastoreItem>
 </file>

</xml_diff>